<commit_message>
S02P31B205-135 | Add ppt
</commit_message>
<xml_diff>
--- a/발표자료/최종발표.pptx
+++ b/발표자료/최종발표.pptx
@@ -22,12 +22,12 @@
   <p:notesSz cx="6858000" cy="9144000"/>
   <p:embeddedFontLst>
     <p:embeddedFont>
-      <p:font typeface="나눔바른고딕" panose="020B0600000101010101" charset="-127"/>
+      <p:font typeface="맑은 고딕" panose="020B0503020000020004" pitchFamily="50" charset="-127"/>
       <p:regular r:id="rId12"/>
       <p:bold r:id="rId13"/>
     </p:embeddedFont>
     <p:embeddedFont>
-      <p:font typeface="맑은 고딕" panose="020B0503020000020004" pitchFamily="50" charset="-127"/>
+      <p:font typeface="나눔바른고딕" panose="020B0603020101020101" pitchFamily="50" charset="-127"/>
       <p:regular r:id="rId14"/>
       <p:bold r:id="rId15"/>
     </p:embeddedFont>
@@ -131,6 +131,9 @@
     <p:ext uri="{EFAFB233-063F-42B5-8137-9DF3F51BA10A}">
       <p15:sldGuideLst xmlns:p15="http://schemas.microsoft.com/office/powerpoint/2012/main"/>
     </p:ext>
+    <p:ext uri="{2D200454-40CA-4A62-9FC3-DE9A4176ACB9}">
+      <p15:notesGuideLst xmlns:p15="http://schemas.microsoft.com/office/powerpoint/2012/main"/>
+    </p:ext>
   </p:extLst>
 </p:presentation>
 </file>
@@ -217,7 +220,7 @@
           <a:p>
             <a:fld id="{C94DCE6A-29A5-41F1-A944-66C1A639CFDF}" type="datetimeFigureOut">
               <a:rPr lang="ko-KR" altLang="en-US" smtClean="0"/>
-              <a:t>2020-06-08</a:t>
+              <a:t>2020-06-09</a:t>
             </a:fld>
             <a:endParaRPr lang="ko-KR" altLang="en-US"/>
           </a:p>
@@ -551,7 +554,7 @@
             </a:r>
             <a:r>
               <a:rPr lang="ko-KR" altLang="en-US" dirty="0" err="1" smtClean="0"/>
-              <a:t>장은비</a:t>
+              <a:t>조규홍</a:t>
             </a:r>
             <a:r>
               <a:rPr lang="ko-KR" altLang="en-US" dirty="0" smtClean="0"/>
@@ -811,44 +814,23 @@
               <a:t> 주요 </a:t>
             </a:r>
             <a:r>
-              <a:rPr lang="ko-KR" altLang="en-US" dirty="0" err="1" smtClean="0"/>
-              <a:t>기능은요</a:t>
-            </a:r>
-            <a:endParaRPr lang="en-US" altLang="ko-KR" dirty="0" smtClean="0"/>
-          </a:p>
-          <a:p>
-            <a:r>
               <a:rPr lang="ko-KR" altLang="en-US" dirty="0" smtClean="0"/>
-              <a:t>첫번째 가족 앨범 입니다</a:t>
+              <a:t>기능을 소개하겠습니다</a:t>
             </a:r>
             <a:r>
               <a:rPr lang="en-US" altLang="ko-KR" dirty="0" smtClean="0"/>
               <a:t>.</a:t>
             </a:r>
-          </a:p>
-          <a:p>
-            <a:r>
-              <a:rPr lang="ko-KR" altLang="en-US" dirty="0" err="1" smtClean="0"/>
-              <a:t>가족원의</a:t>
-            </a:r>
+            <a:endParaRPr lang="en-US" altLang="ko-KR" dirty="0" smtClean="0"/>
+          </a:p>
+          <a:p>
             <a:r>
               <a:rPr lang="ko-KR" altLang="en-US" dirty="0" smtClean="0"/>
-              <a:t> 얼굴을 등록하여 앨범을 생성하면</a:t>
-            </a:r>
-            <a:endParaRPr lang="en-US" altLang="ko-KR" dirty="0" smtClean="0"/>
-          </a:p>
-          <a:p>
+              <a:t>첫번째 가족 앨범 </a:t>
+            </a:r>
             <a:r>
               <a:rPr lang="ko-KR" altLang="en-US" dirty="0" smtClean="0"/>
-              <a:t>이후 사진 </a:t>
-            </a:r>
-            <a:r>
-              <a:rPr lang="ko-KR" altLang="en-US" dirty="0" err="1" smtClean="0"/>
-              <a:t>업로드시</a:t>
-            </a:r>
-            <a:r>
-              <a:rPr lang="ko-KR" altLang="en-US" dirty="0" smtClean="0"/>
-              <a:t> 얼굴인식을 통해 자동으로 해당 가족의 앨범으로 사진이 분류 됩니다</a:t>
+              <a:t>입니다</a:t>
             </a:r>
             <a:r>
               <a:rPr lang="en-US" altLang="ko-KR" dirty="0" smtClean="0"/>
@@ -858,7 +840,34 @@
           <a:p>
             <a:r>
               <a:rPr lang="ko-KR" altLang="en-US" dirty="0" smtClean="0"/>
-              <a:t>자동 업로드 기능을 사용할 경우 본인 외의 </a:t>
+              <a:t>얼굴 인식을 이용해서 가족에 특화된 앨범을 구성했습니다</a:t>
+            </a:r>
+            <a:r>
+              <a:rPr lang="en-US" altLang="ko-KR" dirty="0" smtClean="0"/>
+              <a:t>.</a:t>
+            </a:r>
+          </a:p>
+          <a:p>
+            <a:pPr marL="0" marR="0" lvl="0" indent="0" algn="l" defTabSz="914400" rtl="0" eaLnBrk="1" fontAlgn="auto" latinLnBrk="1" hangingPunct="1">
+              <a:lnSpc>
+                <a:spcPct val="100000"/>
+              </a:lnSpc>
+              <a:spcBef>
+                <a:spcPts val="0"/>
+              </a:spcBef>
+              <a:spcAft>
+                <a:spcPts val="0"/>
+              </a:spcAft>
+              <a:buClrTx/>
+              <a:buSzTx/>
+              <a:buFontTx/>
+              <a:buNone/>
+              <a:tabLst/>
+              <a:defRPr/>
+            </a:pPr>
+            <a:r>
+              <a:rPr lang="ko-KR" altLang="en-US" dirty="0" smtClean="0"/>
+              <a:t>특히 자동 업로드를 할 경우 본인 외의 </a:t>
             </a:r>
             <a:r>
               <a:rPr lang="ko-KR" altLang="en-US" dirty="0" err="1" smtClean="0"/>
@@ -866,7 +875,15 @@
             </a:r>
             <a:r>
               <a:rPr lang="ko-KR" altLang="en-US" dirty="0" smtClean="0"/>
-              <a:t> 얼굴이 있는 사진만 등록이 됩니다</a:t>
+              <a:t> 얼굴이 있는 사진만 등록이 되도록 하여 직접 업로드 해야하는 번거로움을 줄이고 가족들의 사진을 더 쉽게 공유 </a:t>
+            </a:r>
+            <a:r>
+              <a:rPr lang="ko-KR" altLang="en-US" dirty="0" err="1" smtClean="0"/>
+              <a:t>할수</a:t>
+            </a:r>
+            <a:r>
+              <a:rPr lang="ko-KR" altLang="en-US" dirty="0" smtClean="0"/>
+              <a:t> 있게 만들었습니다</a:t>
             </a:r>
             <a:r>
               <a:rPr lang="en-US" altLang="ko-KR" dirty="0" smtClean="0"/>
@@ -874,6 +891,33 @@
             </a:r>
           </a:p>
           <a:p>
+            <a:pPr marL="0" marR="0" lvl="0" indent="0" algn="l" defTabSz="914400" rtl="0" eaLnBrk="1" fontAlgn="auto" latinLnBrk="1" hangingPunct="1">
+              <a:lnSpc>
+                <a:spcPct val="100000"/>
+              </a:lnSpc>
+              <a:spcBef>
+                <a:spcPts val="0"/>
+              </a:spcBef>
+              <a:spcAft>
+                <a:spcPts val="0"/>
+              </a:spcAft>
+              <a:buClrTx/>
+              <a:buSzTx/>
+              <a:buFontTx/>
+              <a:buNone/>
+              <a:tabLst/>
+              <a:defRPr/>
+            </a:pPr>
+            <a:r>
+              <a:rPr lang="ko-KR" altLang="en-US" dirty="0" smtClean="0"/>
+              <a:t>본인 사진을 올리고 싶을 경우 수동 업로드를 이용하면 됩니다</a:t>
+            </a:r>
+            <a:r>
+              <a:rPr lang="en-US" altLang="ko-KR" dirty="0" smtClean="0"/>
+              <a:t>.</a:t>
+            </a:r>
+          </a:p>
+          <a:p>
             <a:endParaRPr lang="en-US" altLang="ko-KR" dirty="0" smtClean="0"/>
           </a:p>
           <a:p>
@@ -889,7 +933,7 @@
           <a:p>
             <a:r>
               <a:rPr lang="ko-KR" altLang="en-US" dirty="0" smtClean="0"/>
-              <a:t>가족구성원이 되면 앱과 웹을 통해 </a:t>
+              <a:t>가족구성원이 되면 </a:t>
             </a:r>
             <a:r>
               <a:rPr lang="ko-KR" altLang="en-US" dirty="0" err="1" smtClean="0"/>
@@ -897,7 +941,19 @@
             </a:r>
             <a:r>
               <a:rPr lang="ko-KR" altLang="en-US" dirty="0" smtClean="0"/>
-              <a:t> 내가 속한 가족의 모든 앨범을 볼 수 있습니다</a:t>
+              <a:t> 앱과 </a:t>
+            </a:r>
+            <a:r>
+              <a:rPr lang="ko-KR" altLang="en-US" dirty="0" smtClean="0"/>
+              <a:t>웹을 통해 </a:t>
+            </a:r>
+            <a:r>
+              <a:rPr lang="ko-KR" altLang="en-US" dirty="0" smtClean="0"/>
+              <a:t>내가 </a:t>
+            </a:r>
+            <a:r>
+              <a:rPr lang="ko-KR" altLang="en-US" dirty="0" smtClean="0"/>
+              <a:t>속한 가족의 모든 앨범을 볼 수 있습니다</a:t>
             </a:r>
             <a:r>
               <a:rPr lang="en-US" altLang="ko-KR" dirty="0" smtClean="0"/>
@@ -923,11 +979,16 @@
             </a:r>
             <a:r>
               <a:rPr lang="ko-KR" altLang="en-US" baseline="0" dirty="0" smtClean="0"/>
-              <a:t> 다운로드도 되고요</a:t>
-            </a:r>
-            <a:endParaRPr lang="en-US" altLang="ko-KR" dirty="0" smtClean="0"/>
-          </a:p>
-          <a:p>
+              <a:t> 다운로드도 </a:t>
+            </a:r>
+            <a:r>
+              <a:rPr lang="ko-KR" altLang="en-US" baseline="0" dirty="0" err="1" smtClean="0"/>
+              <a:t>할수있고</a:t>
+            </a:r>
+            <a:r>
+              <a:rPr lang="en-US" altLang="ko-KR" baseline="0" dirty="0" smtClean="0"/>
+              <a:t> </a:t>
+            </a:r>
             <a:r>
               <a:rPr lang="en-US" altLang="ko-KR" dirty="0" smtClean="0"/>
               <a:t>SNS </a:t>
@@ -942,12 +1003,31 @@
             </a:r>
             <a:r>
               <a:rPr lang="ko-KR" altLang="en-US" dirty="0" smtClean="0"/>
-              <a:t> 외의 사람과도 사진 공유를 할 수 있습니다</a:t>
+              <a:t> 외의 </a:t>
+            </a:r>
+            <a:r>
+              <a:rPr lang="ko-KR" altLang="en-US" dirty="0" smtClean="0"/>
+              <a:t>사람과 </a:t>
+            </a:r>
+            <a:r>
+              <a:rPr lang="ko-KR" altLang="en-US" dirty="0" smtClean="0"/>
+              <a:t>사진 </a:t>
+            </a:r>
+            <a:r>
+              <a:rPr lang="ko-KR" altLang="en-US" dirty="0" smtClean="0"/>
+              <a:t>공유도 </a:t>
+            </a:r>
+            <a:r>
+              <a:rPr lang="ko-KR" altLang="en-US" dirty="0" smtClean="0"/>
+              <a:t>할 수 있습니다</a:t>
             </a:r>
             <a:r>
               <a:rPr lang="en-US" altLang="ko-KR" dirty="0" smtClean="0"/>
               <a:t>.</a:t>
             </a:r>
+          </a:p>
+          <a:p>
+            <a:endParaRPr lang="en-US" altLang="ko-KR" dirty="0" smtClean="0"/>
           </a:p>
         </p:txBody>
       </p:sp>
@@ -1042,36 +1122,8 @@
           </a:p>
           <a:p>
             <a:r>
-              <a:rPr lang="ko-KR" altLang="en-US" dirty="0" smtClean="0"/>
-              <a:t>자식으로 등록된 </a:t>
-            </a:r>
-            <a:r>
-              <a:rPr lang="ko-KR" altLang="en-US" dirty="0" err="1" smtClean="0"/>
-              <a:t>가족원은</a:t>
-            </a:r>
-            <a:r>
-              <a:rPr lang="ko-KR" altLang="en-US" dirty="0" smtClean="0"/>
-              <a:t> 일일</a:t>
-            </a:r>
-            <a:r>
-              <a:rPr lang="en-US" altLang="ko-KR" dirty="0" smtClean="0"/>
-              <a:t>, </a:t>
-            </a:r>
-            <a:r>
-              <a:rPr lang="ko-KR" altLang="en-US" dirty="0" smtClean="0"/>
-              <a:t>주간</a:t>
-            </a:r>
-            <a:r>
-              <a:rPr lang="en-US" altLang="ko-KR" dirty="0" smtClean="0"/>
-              <a:t>, </a:t>
-            </a:r>
-            <a:r>
-              <a:rPr lang="ko-KR" altLang="en-US" dirty="0" smtClean="0"/>
-              <a:t>월간 미션을 통해 포인트를 얻고 부모님과의 추억을 생성할 수</a:t>
-            </a:r>
-            <a:r>
               <a:rPr lang="ko-KR" altLang="en-US" baseline="0" dirty="0" smtClean="0"/>
-              <a:t> 있습니다</a:t>
+              <a:t>가족들과 소통할 수 있는 기회를 늘리기 위해 미션 기능을 만들었습니다</a:t>
             </a:r>
             <a:r>
               <a:rPr lang="en-US" altLang="ko-KR" baseline="0" dirty="0" smtClean="0"/>
@@ -1081,7 +1133,7 @@
           <a:p>
             <a:r>
               <a:rPr lang="ko-KR" altLang="en-US" baseline="0" dirty="0" smtClean="0"/>
-              <a:t>부모님은 직접 자식들에게 미션을 내주고 자식은 부모님이 내준 미션을 수행 할 수 있습니다</a:t>
+              <a:t>미션을 통해서 부모님에 대해 알아가고 부모님과 일상을 기록할 수 있습니다</a:t>
             </a:r>
             <a:r>
               <a:rPr lang="en-US" altLang="ko-KR" baseline="0" dirty="0" smtClean="0"/>
@@ -1089,9 +1141,12 @@
             </a:r>
           </a:p>
           <a:p>
+            <a:endParaRPr lang="en-US" altLang="ko-KR" baseline="0" dirty="0" smtClean="0"/>
+          </a:p>
+          <a:p>
             <a:r>
               <a:rPr lang="ko-KR" altLang="en-US" baseline="0" dirty="0" smtClean="0"/>
-              <a:t>미션을 수행하게 되면 포인트를 제공받습니다</a:t>
+              <a:t>네번째는 푸시 알림입니다</a:t>
             </a:r>
             <a:r>
               <a:rPr lang="en-US" altLang="ko-KR" baseline="0" dirty="0" smtClean="0"/>
@@ -1099,12 +1154,33 @@
             </a:r>
           </a:p>
           <a:p>
-            <a:endParaRPr lang="en-US" altLang="ko-KR" baseline="0" dirty="0" smtClean="0"/>
-          </a:p>
-          <a:p>
+            <a:r>
+              <a:rPr lang="ko-KR" altLang="en-US" baseline="0" dirty="0" err="1" smtClean="0"/>
+              <a:t>가족원이</a:t>
+            </a:r>
             <a:r>
               <a:rPr lang="ko-KR" altLang="en-US" baseline="0" dirty="0" smtClean="0"/>
-              <a:t>네번째는 푸시 알림입니다</a:t>
+              <a:t> 새로운 사진을 </a:t>
+            </a:r>
+            <a:r>
+              <a:rPr lang="ko-KR" altLang="en-US" baseline="0" dirty="0" smtClean="0"/>
+              <a:t>등록했을 때나 </a:t>
+            </a:r>
+            <a:r>
+              <a:rPr lang="ko-KR" altLang="en-US" baseline="0" dirty="0" smtClean="0"/>
+              <a:t>부모님이 자식에게 미션을 </a:t>
+            </a:r>
+            <a:r>
+              <a:rPr lang="ko-KR" altLang="en-US" baseline="0" dirty="0" smtClean="0"/>
+              <a:t>보냈을 때 그리고 </a:t>
+            </a:r>
+            <a:r>
+              <a:rPr lang="ko-KR" altLang="en-US" baseline="0" dirty="0" err="1" smtClean="0"/>
+              <a:t>가족원의</a:t>
+            </a:r>
+            <a:r>
+              <a:rPr lang="ko-KR" altLang="en-US" baseline="0" dirty="0" smtClean="0"/>
+              <a:t> 생일에 알림을 보내 줍니다</a:t>
             </a:r>
             <a:r>
               <a:rPr lang="en-US" altLang="ko-KR" baseline="0" dirty="0" smtClean="0"/>
@@ -1113,20 +1189,12 @@
           </a:p>
           <a:p>
             <a:r>
-              <a:rPr lang="ko-KR" altLang="en-US" baseline="0" dirty="0" err="1" smtClean="0"/>
-              <a:t>가족원이</a:t>
-            </a:r>
-            <a:r>
               <a:rPr lang="ko-KR" altLang="en-US" baseline="0" dirty="0" smtClean="0"/>
-              <a:t> 새로운 사진을 등록하거나 부모님이 자식에게 미션을 보내거나 </a:t>
-            </a:r>
-            <a:r>
-              <a:rPr lang="ko-KR" altLang="en-US" baseline="0" dirty="0" err="1" smtClean="0"/>
-              <a:t>가족원의</a:t>
+              <a:t>일정 </a:t>
             </a:r>
             <a:r>
               <a:rPr lang="ko-KR" altLang="en-US" baseline="0" dirty="0" smtClean="0"/>
-              <a:t> 생일에 알림을 보내 줍니다</a:t>
+              <a:t>기간 사진 업로드가 이루어 지지 않으면 가족과의 추억 생성을 권유하는 알림을 보내 참여율을 높입니다</a:t>
             </a:r>
             <a:r>
               <a:rPr lang="en-US" altLang="ko-KR" baseline="0" dirty="0" smtClean="0"/>
@@ -1134,16 +1202,6 @@
             </a:r>
           </a:p>
           <a:p>
-            <a:r>
-              <a:rPr lang="ko-KR" altLang="en-US" baseline="0" dirty="0" smtClean="0"/>
-              <a:t>일정 기간 사진 업로드가 이루어 지지 않으면 가족과의 추억 생성을 권유하는 알림을 보내 참여율을 높입니다</a:t>
-            </a:r>
-            <a:r>
-              <a:rPr lang="en-US" altLang="ko-KR" baseline="0" dirty="0" smtClean="0"/>
-              <a:t>.</a:t>
-            </a:r>
-          </a:p>
-          <a:p>
             <a:endParaRPr lang="en-US" altLang="ko-KR" baseline="0" dirty="0" smtClean="0"/>
           </a:p>
           <a:p>
@@ -1152,8 +1210,8 @@
               <a:t>시연을 통해 더 자세히 알아보도록 </a:t>
             </a:r>
             <a:r>
-              <a:rPr lang="ko-KR" altLang="en-US" baseline="0" dirty="0" err="1" smtClean="0"/>
-              <a:t>하겠습다</a:t>
+              <a:rPr lang="ko-KR" altLang="en-US" baseline="0" dirty="0" smtClean="0"/>
+              <a:t>하겠습니다</a:t>
             </a:r>
             <a:r>
               <a:rPr lang="en-US" altLang="ko-KR" baseline="0" dirty="0" smtClean="0"/>
@@ -1283,7 +1341,29 @@
           <a:p>
             <a:r>
               <a:rPr lang="ko-KR" altLang="en-US" baseline="0" dirty="0" smtClean="0"/>
-              <a:t>미션의 종류를 늘려 재미요소를 더 추가하고</a:t>
+              <a:t>미션의 종류를 늘려 재미요소를 더 </a:t>
+            </a:r>
+            <a:r>
+              <a:rPr lang="ko-KR" altLang="en-US" baseline="0" dirty="0" smtClean="0"/>
+              <a:t>추가하고</a:t>
+            </a:r>
+            <a:endParaRPr lang="en-US" altLang="ko-KR" baseline="0" dirty="0" smtClean="0"/>
+          </a:p>
+          <a:p>
+            <a:endParaRPr lang="en-US" altLang="ko-KR" baseline="0" dirty="0" smtClean="0"/>
+          </a:p>
+          <a:p>
+            <a:r>
+              <a:rPr lang="ko-KR" altLang="en-US" baseline="0" dirty="0" smtClean="0"/>
+              <a:t>미션 이력을 확인할 수 </a:t>
+            </a:r>
+            <a:r>
+              <a:rPr lang="ko-KR" altLang="en-US" baseline="0" dirty="0" err="1" smtClean="0"/>
+              <a:t>있도록하고</a:t>
+            </a:r>
+            <a:r>
+              <a:rPr lang="ko-KR" altLang="en-US" baseline="0" dirty="0" smtClean="0"/>
+              <a:t> </a:t>
             </a:r>
             <a:endParaRPr lang="en-US" altLang="ko-KR" baseline="0" dirty="0" smtClean="0"/>
           </a:p>
@@ -1506,6 +1586,158 @@
           <a:bodyPr/>
           <a:lstStyle/>
           <a:p>
+            <a:r>
+              <a:rPr lang="ko-KR" altLang="en-US" dirty="0" smtClean="0"/>
+              <a:t>팀원 소개입니다</a:t>
+            </a:r>
+            <a:r>
+              <a:rPr lang="en-US" altLang="ko-KR" dirty="0" smtClean="0"/>
+              <a:t>.</a:t>
+            </a:r>
+          </a:p>
+          <a:p>
+            <a:endParaRPr lang="en-US" altLang="ko-KR" dirty="0" smtClean="0"/>
+          </a:p>
+          <a:p>
+            <a:r>
+              <a:rPr lang="ko-KR" altLang="en-US" dirty="0" smtClean="0"/>
+              <a:t>먼저 팀장 </a:t>
+            </a:r>
+            <a:r>
+              <a:rPr lang="ko-KR" altLang="en-US" dirty="0" err="1" smtClean="0"/>
+              <a:t>조선행</a:t>
+            </a:r>
+            <a:r>
+              <a:rPr lang="ko-KR" altLang="en-US" dirty="0" smtClean="0"/>
+              <a:t> 교육생</a:t>
+            </a:r>
+            <a:endParaRPr lang="en-US" altLang="ko-KR" dirty="0" smtClean="0"/>
+          </a:p>
+          <a:p>
+            <a:r>
+              <a:rPr lang="ko-KR" altLang="en-US" dirty="0" smtClean="0"/>
+              <a:t>앱에서 푸시 알림과 사진 업로드</a:t>
+            </a:r>
+            <a:r>
+              <a:rPr lang="en-US" altLang="ko-KR" dirty="0" smtClean="0"/>
+              <a:t>,</a:t>
+            </a:r>
+            <a:r>
+              <a:rPr lang="en-US" altLang="ko-KR" baseline="0" dirty="0" smtClean="0"/>
+              <a:t> </a:t>
+            </a:r>
+            <a:r>
+              <a:rPr lang="ko-KR" altLang="en-US" baseline="0" dirty="0" smtClean="0"/>
+              <a:t>프로젝트 배포</a:t>
+            </a:r>
+            <a:endParaRPr lang="en-US" altLang="ko-KR" baseline="0" dirty="0" smtClean="0"/>
+          </a:p>
+          <a:p>
+            <a:endParaRPr lang="en-US" altLang="ko-KR" baseline="0" dirty="0" smtClean="0"/>
+          </a:p>
+          <a:p>
+            <a:r>
+              <a:rPr lang="ko-KR" altLang="en-US" baseline="0" dirty="0" smtClean="0"/>
+              <a:t>두번째로 송지영 교육생과 </a:t>
+            </a:r>
+            <a:r>
+              <a:rPr lang="ko-KR" altLang="en-US" baseline="0" dirty="0" err="1" smtClean="0"/>
+              <a:t>박태수</a:t>
+            </a:r>
+            <a:r>
+              <a:rPr lang="ko-KR" altLang="en-US" baseline="0" dirty="0" smtClean="0"/>
+              <a:t> 교육생</a:t>
+            </a:r>
+            <a:endParaRPr lang="en-US" altLang="ko-KR" baseline="0" dirty="0" smtClean="0"/>
+          </a:p>
+          <a:p>
+            <a:r>
+              <a:rPr lang="ko-KR" altLang="en-US" baseline="0" dirty="0" smtClean="0"/>
+              <a:t>앱에서 회원 가입</a:t>
+            </a:r>
+            <a:r>
+              <a:rPr lang="en-US" altLang="ko-KR" baseline="0" dirty="0" smtClean="0"/>
+              <a:t>, </a:t>
+            </a:r>
+            <a:r>
+              <a:rPr lang="ko-KR" altLang="en-US" baseline="0" dirty="0" smtClean="0"/>
+              <a:t>로그인</a:t>
+            </a:r>
+            <a:r>
+              <a:rPr lang="en-US" altLang="ko-KR" baseline="0" dirty="0" smtClean="0"/>
+              <a:t>, </a:t>
+            </a:r>
+            <a:r>
+              <a:rPr lang="ko-KR" altLang="en-US" baseline="0" dirty="0" smtClean="0"/>
+              <a:t>계정 설정 과 </a:t>
+            </a:r>
+            <a:r>
+              <a:rPr lang="en-US" altLang="ko-KR" baseline="0" dirty="0" smtClean="0"/>
+              <a:t>Web</a:t>
+            </a:r>
+          </a:p>
+          <a:p>
+            <a:endParaRPr lang="en-US" altLang="ko-KR" baseline="0" dirty="0" smtClean="0"/>
+          </a:p>
+          <a:p>
+            <a:r>
+              <a:rPr lang="ko-KR" altLang="en-US" baseline="0" dirty="0" smtClean="0"/>
+              <a:t>세번째로 </a:t>
+            </a:r>
+            <a:r>
+              <a:rPr lang="ko-KR" altLang="en-US" baseline="0" dirty="0" err="1" smtClean="0"/>
+              <a:t>장은비</a:t>
+            </a:r>
+            <a:r>
+              <a:rPr lang="ko-KR" altLang="en-US" baseline="0" dirty="0" smtClean="0"/>
+              <a:t> 교육생과 </a:t>
+            </a:r>
+            <a:r>
+              <a:rPr lang="ko-KR" altLang="en-US" baseline="0" dirty="0" err="1" smtClean="0"/>
+              <a:t>조규홍</a:t>
+            </a:r>
+            <a:r>
+              <a:rPr lang="ko-KR" altLang="en-US" baseline="0" dirty="0" smtClean="0"/>
+              <a:t> 교육생</a:t>
+            </a:r>
+            <a:endParaRPr lang="en-US" altLang="ko-KR" baseline="0" dirty="0" smtClean="0"/>
+          </a:p>
+          <a:p>
+            <a:r>
+              <a:rPr lang="ko-KR" altLang="en-US" baseline="0" dirty="0" smtClean="0"/>
+              <a:t>앱에서 앨범</a:t>
+            </a:r>
+            <a:r>
+              <a:rPr lang="en-US" altLang="ko-KR" baseline="0" dirty="0" smtClean="0"/>
+              <a:t>,</a:t>
+            </a:r>
+            <a:r>
+              <a:rPr lang="ko-KR" altLang="en-US" baseline="0" dirty="0" smtClean="0"/>
+              <a:t>사진 조회에 관련된 기능과 미션</a:t>
+            </a:r>
+            <a:r>
+              <a:rPr lang="en-US" altLang="ko-KR" baseline="0" dirty="0" smtClean="0"/>
+              <a:t> / </a:t>
+            </a:r>
+            <a:r>
+              <a:rPr lang="ko-KR" altLang="en-US" baseline="0" dirty="0" smtClean="0"/>
+              <a:t>퀴즈</a:t>
+            </a:r>
+            <a:r>
+              <a:rPr lang="en-US" altLang="ko-KR" baseline="0" dirty="0" smtClean="0"/>
+              <a:t>, </a:t>
+            </a:r>
+            <a:r>
+              <a:rPr lang="ko-KR" altLang="en-US" baseline="0" dirty="0" smtClean="0"/>
+              <a:t>그리고 가족 관계 설정에 관련된 업무를 맡아서 진행했습니다</a:t>
+            </a:r>
+            <a:r>
+              <a:rPr lang="en-US" altLang="ko-KR" baseline="0" dirty="0" smtClean="0"/>
+              <a:t>.</a:t>
+            </a:r>
+            <a:endParaRPr lang="en-US" altLang="ko-KR" dirty="0" smtClean="0"/>
+          </a:p>
+          <a:p>
             <a:endParaRPr lang="ko-KR" altLang="en-US" dirty="0"/>
           </a:p>
         </p:txBody>
@@ -1537,6 +1769,194 @@
     <p:extLst>
       <p:ext uri="{BB962C8B-B14F-4D97-AF65-F5344CB8AC3E}">
         <p14:creationId xmlns:p14="http://schemas.microsoft.com/office/powerpoint/2010/main" val="3518852218"/>
+      </p:ext>
+    </p:extLst>
+  </p:cSld>
+  <p:clrMapOvr>
+    <a:masterClrMapping/>
+  </p:clrMapOvr>
+</p:notes>
+</file>
+
+<file path=ppt/notesSlides/notesSlide8.xml><?xml version="1.0" encoding="utf-8"?>
+<p:notes xmlns:a="http://schemas.openxmlformats.org/drawingml/2006/main" xmlns:r="http://schemas.openxmlformats.org/officeDocument/2006/relationships" xmlns:p="http://schemas.openxmlformats.org/presentationml/2006/main">
+  <p:cSld>
+    <p:spTree>
+      <p:nvGrpSpPr>
+        <p:cNvPr id="1" name=""/>
+        <p:cNvGrpSpPr/>
+        <p:nvPr/>
+      </p:nvGrpSpPr>
+      <p:grpSpPr>
+        <a:xfrm>
+          <a:off x="0" y="0"/>
+          <a:ext cx="0" cy="0"/>
+          <a:chOff x="0" y="0"/>
+          <a:chExt cx="0" cy="0"/>
+        </a:xfrm>
+      </p:grpSpPr>
+      <p:sp>
+        <p:nvSpPr>
+          <p:cNvPr id="2" name="슬라이드 이미지 개체 틀 1"/>
+          <p:cNvSpPr>
+            <a:spLocks noGrp="1" noRot="1" noChangeAspect="1"/>
+          </p:cNvSpPr>
+          <p:nvPr>
+            <p:ph type="sldImg"/>
+          </p:nvPr>
+        </p:nvSpPr>
+        <p:spPr/>
+      </p:sp>
+      <p:sp>
+        <p:nvSpPr>
+          <p:cNvPr id="3" name="슬라이드 노트 개체 틀 2"/>
+          <p:cNvSpPr>
+            <a:spLocks noGrp="1"/>
+          </p:cNvSpPr>
+          <p:nvPr>
+            <p:ph type="body" idx="1"/>
+          </p:nvPr>
+        </p:nvSpPr>
+        <p:spPr/>
+        <p:txBody>
+          <a:bodyPr/>
+          <a:lstStyle/>
+          <a:p>
+            <a:r>
+              <a:rPr lang="ko-KR" altLang="en-US" dirty="0" smtClean="0"/>
+              <a:t>추억에 가족을 담다</a:t>
+            </a:r>
+            <a:endParaRPr lang="ko-KR" altLang="en-US" dirty="0"/>
+          </a:p>
+        </p:txBody>
+      </p:sp>
+      <p:sp>
+        <p:nvSpPr>
+          <p:cNvPr id="4" name="슬라이드 번호 개체 틀 3"/>
+          <p:cNvSpPr>
+            <a:spLocks noGrp="1"/>
+          </p:cNvSpPr>
+          <p:nvPr>
+            <p:ph type="sldNum" sz="quarter" idx="10"/>
+          </p:nvPr>
+        </p:nvSpPr>
+        <p:spPr/>
+        <p:txBody>
+          <a:bodyPr/>
+          <a:lstStyle/>
+          <a:p>
+            <a:fld id="{E3140777-41CF-4CD6-A72A-DB34CB2D11EE}" type="slidenum">
+              <a:rPr lang="ko-KR" altLang="en-US" smtClean="0"/>
+              <a:t>8</a:t>
+            </a:fld>
+            <a:endParaRPr lang="ko-KR" altLang="en-US"/>
+          </a:p>
+        </p:txBody>
+      </p:sp>
+    </p:spTree>
+    <p:extLst>
+      <p:ext uri="{BB962C8B-B14F-4D97-AF65-F5344CB8AC3E}">
+        <p14:creationId xmlns:p14="http://schemas.microsoft.com/office/powerpoint/2010/main" val="2125766726"/>
+      </p:ext>
+    </p:extLst>
+  </p:cSld>
+  <p:clrMapOvr>
+    <a:masterClrMapping/>
+  </p:clrMapOvr>
+</p:notes>
+</file>
+
+<file path=ppt/notesSlides/notesSlide9.xml><?xml version="1.0" encoding="utf-8"?>
+<p:notes xmlns:a="http://schemas.openxmlformats.org/drawingml/2006/main" xmlns:r="http://schemas.openxmlformats.org/officeDocument/2006/relationships" xmlns:p="http://schemas.openxmlformats.org/presentationml/2006/main">
+  <p:cSld>
+    <p:spTree>
+      <p:nvGrpSpPr>
+        <p:cNvPr id="1" name=""/>
+        <p:cNvGrpSpPr/>
+        <p:nvPr/>
+      </p:nvGrpSpPr>
+      <p:grpSpPr>
+        <a:xfrm>
+          <a:off x="0" y="0"/>
+          <a:ext cx="0" cy="0"/>
+          <a:chOff x="0" y="0"/>
+          <a:chExt cx="0" cy="0"/>
+        </a:xfrm>
+      </p:grpSpPr>
+      <p:sp>
+        <p:nvSpPr>
+          <p:cNvPr id="2" name="슬라이드 이미지 개체 틀 1"/>
+          <p:cNvSpPr>
+            <a:spLocks noGrp="1" noRot="1" noChangeAspect="1"/>
+          </p:cNvSpPr>
+          <p:nvPr>
+            <p:ph type="sldImg"/>
+          </p:nvPr>
+        </p:nvSpPr>
+        <p:spPr/>
+      </p:sp>
+      <p:sp>
+        <p:nvSpPr>
+          <p:cNvPr id="3" name="슬라이드 노트 개체 틀 2"/>
+          <p:cNvSpPr>
+            <a:spLocks noGrp="1"/>
+          </p:cNvSpPr>
+          <p:nvPr>
+            <p:ph type="body" idx="1"/>
+          </p:nvPr>
+        </p:nvSpPr>
+        <p:spPr/>
+        <p:txBody>
+          <a:bodyPr/>
+          <a:lstStyle/>
+          <a:p>
+            <a:r>
+              <a:rPr lang="ko-KR" altLang="en-US" dirty="0" smtClean="0"/>
+              <a:t>이상 발표를 마치겠습니다</a:t>
+            </a:r>
+            <a:r>
+              <a:rPr lang="en-US" altLang="ko-KR" dirty="0" smtClean="0"/>
+              <a:t>. </a:t>
+            </a:r>
+            <a:r>
+              <a:rPr lang="ko-KR" altLang="en-US" dirty="0" smtClean="0"/>
+              <a:t>감사합니다</a:t>
+            </a:r>
+            <a:r>
+              <a:rPr lang="en-US" altLang="ko-KR" smtClean="0"/>
+              <a:t>.</a:t>
+            </a:r>
+            <a:endParaRPr lang="ko-KR" altLang="en-US"/>
+          </a:p>
+        </p:txBody>
+      </p:sp>
+      <p:sp>
+        <p:nvSpPr>
+          <p:cNvPr id="4" name="슬라이드 번호 개체 틀 3"/>
+          <p:cNvSpPr>
+            <a:spLocks noGrp="1"/>
+          </p:cNvSpPr>
+          <p:nvPr>
+            <p:ph type="sldNum" sz="quarter" idx="10"/>
+          </p:nvPr>
+        </p:nvSpPr>
+        <p:spPr/>
+        <p:txBody>
+          <a:bodyPr/>
+          <a:lstStyle/>
+          <a:p>
+            <a:fld id="{E3140777-41CF-4CD6-A72A-DB34CB2D11EE}" type="slidenum">
+              <a:rPr lang="ko-KR" altLang="en-US" smtClean="0"/>
+              <a:t>9</a:t>
+            </a:fld>
+            <a:endParaRPr lang="ko-KR" altLang="en-US"/>
+          </a:p>
+        </p:txBody>
+      </p:sp>
+    </p:spTree>
+    <p:extLst>
+      <p:ext uri="{BB962C8B-B14F-4D97-AF65-F5344CB8AC3E}">
+        <p14:creationId xmlns:p14="http://schemas.microsoft.com/office/powerpoint/2010/main" val="3910291138"/>
       </p:ext>
     </p:extLst>
   </p:cSld>
@@ -1684,7 +2104,7 @@
                 </a:solidFill>
               </a:rPr>
               <a:pPr/>
-              <a:t>2020-06-08</a:t>
+              <a:t>2020-06-09</a:t>
             </a:fld>
             <a:endParaRPr lang="ko-KR" altLang="en-US">
               <a:solidFill>
@@ -1886,7 +2306,7 @@
                 </a:solidFill>
               </a:rPr>
               <a:pPr/>
-              <a:t>2020-06-08</a:t>
+              <a:t>2020-06-09</a:t>
             </a:fld>
             <a:endParaRPr lang="ko-KR" altLang="en-US">
               <a:solidFill>
@@ -2098,7 +2518,7 @@
                 </a:solidFill>
               </a:rPr>
               <a:pPr/>
-              <a:t>2020-06-08</a:t>
+              <a:t>2020-06-09</a:t>
             </a:fld>
             <a:endParaRPr lang="ko-KR" altLang="en-US">
               <a:solidFill>
@@ -2300,7 +2720,7 @@
                 </a:solidFill>
               </a:rPr>
               <a:pPr/>
-              <a:t>2020-06-08</a:t>
+              <a:t>2020-06-09</a:t>
             </a:fld>
             <a:endParaRPr lang="ko-KR" altLang="en-US">
               <a:solidFill>
@@ -2578,7 +2998,7 @@
                 </a:solidFill>
               </a:rPr>
               <a:pPr/>
-              <a:t>2020-06-08</a:t>
+              <a:t>2020-06-09</a:t>
             </a:fld>
             <a:endParaRPr lang="ko-KR" altLang="en-US">
               <a:solidFill>
@@ -2842,7 +3262,7 @@
                 </a:solidFill>
               </a:rPr>
               <a:pPr/>
-              <a:t>2020-06-08</a:t>
+              <a:t>2020-06-09</a:t>
             </a:fld>
             <a:endParaRPr lang="ko-KR" altLang="en-US">
               <a:solidFill>
@@ -3241,7 +3661,7 @@
                 </a:solidFill>
               </a:rPr>
               <a:pPr/>
-              <a:t>2020-06-08</a:t>
+              <a:t>2020-06-09</a:t>
             </a:fld>
             <a:endParaRPr lang="ko-KR" altLang="en-US">
               <a:solidFill>
@@ -3391,7 +3811,7 @@
                 </a:solidFill>
               </a:rPr>
               <a:pPr/>
-              <a:t>2020-06-08</a:t>
+              <a:t>2020-06-09</a:t>
             </a:fld>
             <a:endParaRPr lang="ko-KR" altLang="en-US">
               <a:solidFill>
@@ -3518,7 +3938,7 @@
                 </a:solidFill>
               </a:rPr>
               <a:pPr/>
-              <a:t>2020-06-08</a:t>
+              <a:t>2020-06-09</a:t>
             </a:fld>
             <a:endParaRPr lang="ko-KR" altLang="en-US">
               <a:solidFill>
@@ -3827,7 +4247,7 @@
                 </a:solidFill>
               </a:rPr>
               <a:pPr/>
-              <a:t>2020-06-08</a:t>
+              <a:t>2020-06-09</a:t>
             </a:fld>
             <a:endParaRPr lang="ko-KR" altLang="en-US">
               <a:solidFill>
@@ -4112,7 +4532,7 @@
                 </a:solidFill>
               </a:rPr>
               <a:pPr/>
-              <a:t>2020-06-08</a:t>
+              <a:t>2020-06-09</a:t>
             </a:fld>
             <a:endParaRPr lang="ko-KR" altLang="en-US">
               <a:solidFill>
@@ -4357,7 +4777,7 @@
                 </a:solidFill>
               </a:rPr>
               <a:pPr/>
-              <a:t>2020-06-08</a:t>
+              <a:t>2020-06-09</a:t>
             </a:fld>
             <a:endParaRPr lang="ko-KR" altLang="en-US">
               <a:solidFill>
@@ -6291,28 +6711,7 @@
                 <a:latin typeface="나눔바른고딕" panose="020B0603020101020101" pitchFamily="50" charset="-127"/>
                 <a:ea typeface="나눔바른고딕" panose="020B0603020101020101" pitchFamily="50" charset="-127"/>
               </a:rPr>
-              <a:t>가족들끼리 조금 더 쉽게 </a:t>
-            </a:r>
-            <a:r>
-              <a:rPr lang="ko-KR" altLang="en-US" sz="2000" dirty="0" smtClean="0">
-                <a:latin typeface="나눔바른고딕" panose="020B0603020101020101" pitchFamily="50" charset="-127"/>
-                <a:ea typeface="나눔바른고딕" panose="020B0603020101020101" pitchFamily="50" charset="-127"/>
-              </a:rPr>
-              <a:t>일상 모습</a:t>
-            </a:r>
-            <a:r>
-              <a:rPr lang="ko-KR" altLang="en-US" sz="2000" dirty="0" smtClean="0">
-                <a:latin typeface="나눔바른고딕" panose="020B0603020101020101" pitchFamily="50" charset="-127"/>
-                <a:ea typeface="나눔바른고딕" panose="020B0603020101020101" pitchFamily="50" charset="-127"/>
-              </a:rPr>
-              <a:t>을 </a:t>
-            </a:r>
-            <a:r>
-              <a:rPr lang="ko-KR" altLang="en-US" sz="2000" dirty="0" smtClean="0">
-                <a:latin typeface="나눔바른고딕" panose="020B0603020101020101" pitchFamily="50" charset="-127"/>
-                <a:ea typeface="나눔바른고딕" panose="020B0603020101020101" pitchFamily="50" charset="-127"/>
-              </a:rPr>
-              <a:t>공유하고</a:t>
+              <a:t>가족들끼리 조금 더 쉽게 일상 모습을 공유하고</a:t>
             </a:r>
             <a:r>
               <a:rPr lang="en-US" altLang="ko-KR" sz="2000" dirty="0" smtClean="0">
@@ -6845,7 +7244,7 @@
         <p:spPr>
           <a:xfrm>
             <a:off x="2447710" y="1883959"/>
-            <a:ext cx="8641977" cy="4154984"/>
+            <a:ext cx="8641977" cy="4616648"/>
           </a:xfrm>
           <a:prstGeom prst="rect">
             <a:avLst/>
@@ -6932,6 +7331,17 @@
               </a:rPr>
               <a:t>본인 외의 가족 얼굴이 있는 사진만 업로드</a:t>
             </a:r>
+            <a:endParaRPr lang="en-US" altLang="ko-KR" sz="2000" dirty="0" smtClean="0">
+              <a:latin typeface="나눔바른고딕" panose="020B0603020101020101" pitchFamily="50" charset="-127"/>
+              <a:ea typeface="나눔바른고딕" panose="020B0603020101020101" pitchFamily="50" charset="-127"/>
+            </a:endParaRPr>
+          </a:p>
+          <a:p>
+            <a:pPr lvl="1">
+              <a:lnSpc>
+                <a:spcPct val="150000"/>
+              </a:lnSpc>
+            </a:pPr>
             <a:endParaRPr lang="en-US" altLang="ko-KR" sz="2000" dirty="0" smtClean="0">
               <a:latin typeface="나눔바른고딕" panose="020B0603020101020101" pitchFamily="50" charset="-127"/>
               <a:ea typeface="나눔바른고딕" panose="020B0603020101020101" pitchFamily="50" charset="-127"/>
@@ -8327,7 +8737,7 @@
         <p:spPr>
           <a:xfrm>
             <a:off x="2483224" y="2293549"/>
-            <a:ext cx="7568390" cy="3170099"/>
+            <a:ext cx="7568390" cy="3785652"/>
           </a:xfrm>
           <a:prstGeom prst="rect">
             <a:avLst/>
@@ -8511,6 +8921,50 @@
                 <a:ea typeface="나눔바른고딕" panose="020B0603020101020101" pitchFamily="50" charset="-127"/>
               </a:rPr>
               <a:t>3. </a:t>
+            </a:r>
+            <a:r>
+              <a:rPr lang="ko-KR" altLang="en-US" sz="2000" dirty="0" smtClean="0">
+                <a:solidFill>
+                  <a:sysClr val="windowText" lastClr="000000"/>
+                </a:solidFill>
+                <a:latin typeface="나눔바른고딕" panose="020B0603020101020101" pitchFamily="50" charset="-127"/>
+                <a:ea typeface="나눔바른고딕" panose="020B0603020101020101" pitchFamily="50" charset="-127"/>
+              </a:rPr>
+              <a:t>미션 기록 페이지</a:t>
+            </a:r>
+            <a:r>
+              <a:rPr lang="en-US" altLang="ko-KR" sz="2000" dirty="0" smtClean="0">
+                <a:solidFill>
+                  <a:sysClr val="windowText" lastClr="000000"/>
+                </a:solidFill>
+                <a:latin typeface="나눔바른고딕" panose="020B0603020101020101" pitchFamily="50" charset="-127"/>
+                <a:ea typeface="나눔바른고딕" panose="020B0603020101020101" pitchFamily="50" charset="-127"/>
+              </a:rPr>
+              <a:t> </a:t>
+            </a:r>
+            <a:endParaRPr lang="en-US" altLang="ko-KR" sz="2000" dirty="0" smtClean="0">
+              <a:solidFill>
+                <a:sysClr val="windowText" lastClr="000000"/>
+              </a:solidFill>
+              <a:latin typeface="나눔바른고딕" panose="020B0603020101020101" pitchFamily="50" charset="-127"/>
+              <a:ea typeface="나눔바른고딕" panose="020B0603020101020101" pitchFamily="50" charset="-127"/>
+            </a:endParaRPr>
+          </a:p>
+          <a:p>
+            <a:pPr>
+              <a:lnSpc>
+                <a:spcPct val="200000"/>
+              </a:lnSpc>
+            </a:pPr>
+            <a:r>
+              <a:rPr lang="en-US" altLang="ko-KR" sz="2000" dirty="0" smtClean="0">
+                <a:solidFill>
+                  <a:sysClr val="windowText" lastClr="000000"/>
+                </a:solidFill>
+                <a:latin typeface="나눔바른고딕" panose="020B0603020101020101" pitchFamily="50" charset="-127"/>
+                <a:ea typeface="나눔바른고딕" panose="020B0603020101020101" pitchFamily="50" charset="-127"/>
+              </a:rPr>
+              <a:t>4. </a:t>
             </a:r>
             <a:r>
               <a:rPr lang="ko-KR" altLang="en-US" sz="2000" dirty="0" smtClean="0">
@@ -9503,6 +9957,849 @@
           </a:p>
         </p:txBody>
       </p:sp>
+      <p:pic>
+        <p:nvPicPr>
+          <p:cNvPr id="4" name="그림 3"/>
+          <p:cNvPicPr>
+            <a:picLocks noChangeAspect="1"/>
+          </p:cNvPicPr>
+          <p:nvPr/>
+        </p:nvPicPr>
+        <p:blipFill>
+          <a:blip r:embed="rId3" cstate="print">
+            <a:extLst>
+              <a:ext uri="{28A0092B-C50C-407E-A947-70E740481C1C}">
+                <a14:useLocalDpi xmlns:a14="http://schemas.microsoft.com/office/drawing/2010/main" val="0"/>
+              </a:ext>
+            </a:extLst>
+          </a:blip>
+          <a:stretch>
+            <a:fillRect/>
+          </a:stretch>
+        </p:blipFill>
+        <p:spPr>
+          <a:xfrm>
+            <a:off x="4530252" y="2180597"/>
+            <a:ext cx="1365644" cy="1800000"/>
+          </a:xfrm>
+          <a:prstGeom prst="rect">
+            <a:avLst/>
+          </a:prstGeom>
+          <a:effectLst>
+            <a:softEdge rad="101600"/>
+          </a:effectLst>
+        </p:spPr>
+      </p:pic>
+      <p:pic>
+        <p:nvPicPr>
+          <p:cNvPr id="6" name="그림 5"/>
+          <p:cNvPicPr>
+            <a:picLocks noChangeAspect="1"/>
+          </p:cNvPicPr>
+          <p:nvPr/>
+        </p:nvPicPr>
+        <p:blipFill rotWithShape="1">
+          <a:blip r:embed="rId4" cstate="print">
+            <a:extLst>
+              <a:ext uri="{28A0092B-C50C-407E-A947-70E740481C1C}">
+                <a14:useLocalDpi xmlns:a14="http://schemas.microsoft.com/office/drawing/2010/main" val="0"/>
+              </a:ext>
+            </a:extLst>
+          </a:blip>
+          <a:srcRect l="10382" r="9132"/>
+          <a:stretch/>
+        </p:blipFill>
+        <p:spPr>
+          <a:xfrm>
+            <a:off x="2294396" y="2180597"/>
+            <a:ext cx="1366444" cy="1800000"/>
+          </a:xfrm>
+          <a:prstGeom prst="rect">
+            <a:avLst/>
+          </a:prstGeom>
+          <a:effectLst>
+            <a:softEdge rad="101600"/>
+          </a:effectLst>
+        </p:spPr>
+      </p:pic>
+      <p:pic>
+        <p:nvPicPr>
+          <p:cNvPr id="9" name="그림 8"/>
+          <p:cNvPicPr>
+            <a:picLocks noChangeAspect="1"/>
+          </p:cNvPicPr>
+          <p:nvPr/>
+        </p:nvPicPr>
+        <p:blipFill>
+          <a:blip r:embed="rId5" cstate="print">
+            <a:extLst>
+              <a:ext uri="{28A0092B-C50C-407E-A947-70E740481C1C}">
+                <a14:useLocalDpi xmlns:a14="http://schemas.microsoft.com/office/drawing/2010/main" val="0"/>
+              </a:ext>
+            </a:extLst>
+          </a:blip>
+          <a:stretch>
+            <a:fillRect/>
+          </a:stretch>
+        </p:blipFill>
+        <p:spPr>
+          <a:xfrm>
+            <a:off x="6036640" y="2180597"/>
+            <a:ext cx="1351352" cy="1800000"/>
+          </a:xfrm>
+          <a:prstGeom prst="rect">
+            <a:avLst/>
+          </a:prstGeom>
+          <a:effectLst>
+            <a:softEdge rad="101600"/>
+          </a:effectLst>
+        </p:spPr>
+      </p:pic>
+      <p:pic>
+        <p:nvPicPr>
+          <p:cNvPr id="10" name="그림 9"/>
+          <p:cNvPicPr>
+            <a:picLocks noChangeAspect="1"/>
+          </p:cNvPicPr>
+          <p:nvPr/>
+        </p:nvPicPr>
+        <p:blipFill>
+          <a:blip r:embed="rId6" cstate="print">
+            <a:extLst>
+              <a:ext uri="{28A0092B-C50C-407E-A947-70E740481C1C}">
+                <a14:useLocalDpi xmlns:a14="http://schemas.microsoft.com/office/drawing/2010/main" val="0"/>
+              </a:ext>
+            </a:extLst>
+          </a:blip>
+          <a:stretch>
+            <a:fillRect/>
+          </a:stretch>
+        </p:blipFill>
+        <p:spPr>
+          <a:xfrm>
+            <a:off x="8099422" y="2180597"/>
+            <a:ext cx="1347146" cy="1800000"/>
+          </a:xfrm>
+          <a:prstGeom prst="rect">
+            <a:avLst/>
+          </a:prstGeom>
+          <a:effectLst>
+            <a:softEdge rad="101600"/>
+          </a:effectLst>
+        </p:spPr>
+      </p:pic>
+      <p:pic>
+        <p:nvPicPr>
+          <p:cNvPr id="11" name="그림 10"/>
+          <p:cNvPicPr>
+            <a:picLocks noChangeAspect="1"/>
+          </p:cNvPicPr>
+          <p:nvPr/>
+        </p:nvPicPr>
+        <p:blipFill>
+          <a:blip r:embed="rId7" cstate="print">
+            <a:extLst>
+              <a:ext uri="{28A0092B-C50C-407E-A947-70E740481C1C}">
+                <a14:useLocalDpi xmlns:a14="http://schemas.microsoft.com/office/drawing/2010/main" val="0"/>
+              </a:ext>
+            </a:extLst>
+          </a:blip>
+          <a:stretch>
+            <a:fillRect/>
+          </a:stretch>
+        </p:blipFill>
+        <p:spPr>
+          <a:xfrm>
+            <a:off x="9679140" y="2180597"/>
+            <a:ext cx="1351352" cy="1800000"/>
+          </a:xfrm>
+          <a:prstGeom prst="rect">
+            <a:avLst/>
+          </a:prstGeom>
+          <a:effectLst>
+            <a:softEdge rad="101600"/>
+          </a:effectLst>
+        </p:spPr>
+      </p:pic>
+      <p:sp>
+        <p:nvSpPr>
+          <p:cNvPr id="12" name="모서리가 둥근 직사각형 11"/>
+          <p:cNvSpPr/>
+          <p:nvPr/>
+        </p:nvSpPr>
+        <p:spPr>
+          <a:xfrm>
+            <a:off x="4297680" y="1989467"/>
+            <a:ext cx="3350073" cy="4213213"/>
+          </a:xfrm>
+          <a:prstGeom prst="roundRect">
+            <a:avLst/>
+          </a:prstGeom>
+          <a:noFill/>
+          <a:ln>
+            <a:miter lim="800000"/>
+          </a:ln>
+        </p:spPr>
+        <p:style>
+          <a:lnRef idx="2">
+            <a:schemeClr val="accent1">
+              <a:shade val="50000"/>
+            </a:schemeClr>
+          </a:lnRef>
+          <a:fillRef idx="1">
+            <a:schemeClr val="accent1"/>
+          </a:fillRef>
+          <a:effectRef idx="0">
+            <a:schemeClr val="accent1"/>
+          </a:effectRef>
+          <a:fontRef idx="minor">
+            <a:schemeClr val="lt1"/>
+          </a:fontRef>
+        </p:style>
+        <p:txBody>
+          <a:bodyPr rtlCol="0" anchor="ctr"/>
+          <a:lstStyle/>
+          <a:p>
+            <a:pPr algn="ctr"/>
+            <a:endParaRPr lang="ko-KR" altLang="en-US"/>
+          </a:p>
+        </p:txBody>
+      </p:sp>
+      <p:sp>
+        <p:nvSpPr>
+          <p:cNvPr id="15" name="모서리가 둥근 직사각형 14"/>
+          <p:cNvSpPr/>
+          <p:nvPr/>
+        </p:nvSpPr>
+        <p:spPr>
+          <a:xfrm>
+            <a:off x="7880325" y="1989467"/>
+            <a:ext cx="3350073" cy="4213213"/>
+          </a:xfrm>
+          <a:prstGeom prst="roundRect">
+            <a:avLst/>
+          </a:prstGeom>
+          <a:noFill/>
+        </p:spPr>
+        <p:style>
+          <a:lnRef idx="2">
+            <a:schemeClr val="accent1">
+              <a:shade val="50000"/>
+            </a:schemeClr>
+          </a:lnRef>
+          <a:fillRef idx="1">
+            <a:schemeClr val="accent1"/>
+          </a:fillRef>
+          <a:effectRef idx="0">
+            <a:schemeClr val="accent1"/>
+          </a:effectRef>
+          <a:fontRef idx="minor">
+            <a:schemeClr val="lt1"/>
+          </a:fontRef>
+        </p:style>
+        <p:txBody>
+          <a:bodyPr rtlCol="0" anchor="ctr"/>
+          <a:lstStyle/>
+          <a:p>
+            <a:pPr algn="ctr"/>
+            <a:endParaRPr lang="ko-KR" altLang="en-US"/>
+          </a:p>
+        </p:txBody>
+      </p:sp>
+      <p:sp>
+        <p:nvSpPr>
+          <p:cNvPr id="13" name="TextBox 12"/>
+          <p:cNvSpPr txBox="1"/>
+          <p:nvPr/>
+        </p:nvSpPr>
+        <p:spPr>
+          <a:xfrm>
+            <a:off x="4530252" y="4010406"/>
+            <a:ext cx="1303878" cy="369332"/>
+          </a:xfrm>
+          <a:prstGeom prst="rect">
+            <a:avLst/>
+          </a:prstGeom>
+          <a:noFill/>
+        </p:spPr>
+        <p:txBody>
+          <a:bodyPr wrap="square" rtlCol="0">
+            <a:spAutoFit/>
+          </a:bodyPr>
+          <a:lstStyle/>
+          <a:p>
+            <a:pPr algn="ctr"/>
+            <a:r>
+              <a:rPr lang="ko-KR" altLang="en-US" dirty="0" smtClean="0"/>
+              <a:t>송지영</a:t>
+            </a:r>
+            <a:endParaRPr lang="ko-KR" altLang="en-US" dirty="0"/>
+          </a:p>
+        </p:txBody>
+      </p:sp>
+      <p:sp>
+        <p:nvSpPr>
+          <p:cNvPr id="17" name="TextBox 16"/>
+          <p:cNvSpPr txBox="1"/>
+          <p:nvPr/>
+        </p:nvSpPr>
+        <p:spPr>
+          <a:xfrm>
+            <a:off x="6060377" y="4009263"/>
+            <a:ext cx="1303878" cy="369332"/>
+          </a:xfrm>
+          <a:prstGeom prst="rect">
+            <a:avLst/>
+          </a:prstGeom>
+          <a:noFill/>
+        </p:spPr>
+        <p:txBody>
+          <a:bodyPr wrap="square" rtlCol="0">
+            <a:spAutoFit/>
+          </a:bodyPr>
+          <a:lstStyle/>
+          <a:p>
+            <a:pPr algn="ctr"/>
+            <a:r>
+              <a:rPr lang="ko-KR" altLang="en-US" dirty="0" err="1" smtClean="0"/>
+              <a:t>박태수</a:t>
+            </a:r>
+            <a:endParaRPr lang="ko-KR" altLang="en-US" dirty="0"/>
+          </a:p>
+        </p:txBody>
+      </p:sp>
+      <p:sp>
+        <p:nvSpPr>
+          <p:cNvPr id="18" name="TextBox 17"/>
+          <p:cNvSpPr txBox="1"/>
+          <p:nvPr/>
+        </p:nvSpPr>
+        <p:spPr>
+          <a:xfrm>
+            <a:off x="8121056" y="3987061"/>
+            <a:ext cx="1303878" cy="369332"/>
+          </a:xfrm>
+          <a:prstGeom prst="rect">
+            <a:avLst/>
+          </a:prstGeom>
+          <a:noFill/>
+        </p:spPr>
+        <p:txBody>
+          <a:bodyPr wrap="square" rtlCol="0">
+            <a:spAutoFit/>
+          </a:bodyPr>
+          <a:lstStyle/>
+          <a:p>
+            <a:pPr algn="ctr"/>
+            <a:r>
+              <a:rPr lang="ko-KR" altLang="en-US" dirty="0" err="1" smtClean="0"/>
+              <a:t>장은비</a:t>
+            </a:r>
+            <a:endParaRPr lang="ko-KR" altLang="en-US" dirty="0"/>
+          </a:p>
+        </p:txBody>
+      </p:sp>
+      <p:sp>
+        <p:nvSpPr>
+          <p:cNvPr id="19" name="TextBox 18"/>
+          <p:cNvSpPr txBox="1"/>
+          <p:nvPr/>
+        </p:nvSpPr>
+        <p:spPr>
+          <a:xfrm>
+            <a:off x="9702877" y="3980597"/>
+            <a:ext cx="1303878" cy="369332"/>
+          </a:xfrm>
+          <a:prstGeom prst="rect">
+            <a:avLst/>
+          </a:prstGeom>
+          <a:noFill/>
+        </p:spPr>
+        <p:txBody>
+          <a:bodyPr wrap="square" rtlCol="0">
+            <a:spAutoFit/>
+          </a:bodyPr>
+          <a:lstStyle/>
+          <a:p>
+            <a:pPr algn="ctr"/>
+            <a:r>
+              <a:rPr lang="ko-KR" altLang="en-US" dirty="0" err="1" smtClean="0"/>
+              <a:t>조규홍</a:t>
+            </a:r>
+            <a:endParaRPr lang="ko-KR" altLang="en-US" dirty="0"/>
+          </a:p>
+        </p:txBody>
+      </p:sp>
+      <p:sp>
+        <p:nvSpPr>
+          <p:cNvPr id="20" name="TextBox 19"/>
+          <p:cNvSpPr txBox="1"/>
+          <p:nvPr/>
+        </p:nvSpPr>
+        <p:spPr>
+          <a:xfrm>
+            <a:off x="1865339" y="3987061"/>
+            <a:ext cx="2107206" cy="430887"/>
+          </a:xfrm>
+          <a:prstGeom prst="rect">
+            <a:avLst/>
+          </a:prstGeom>
+          <a:noFill/>
+        </p:spPr>
+        <p:txBody>
+          <a:bodyPr wrap="square" rtlCol="0">
+            <a:spAutoFit/>
+          </a:bodyPr>
+          <a:lstStyle/>
+          <a:p>
+            <a:pPr algn="ctr"/>
+            <a:r>
+              <a:rPr lang="ko-KR" altLang="en-US" sz="2200" dirty="0" smtClean="0"/>
+              <a:t>팀장</a:t>
+            </a:r>
+            <a:r>
+              <a:rPr lang="ko-KR" altLang="en-US" dirty="0" smtClean="0"/>
+              <a:t> </a:t>
+            </a:r>
+            <a:r>
+              <a:rPr lang="ko-KR" altLang="en-US" dirty="0" err="1" smtClean="0"/>
+              <a:t>조선행</a:t>
+            </a:r>
+            <a:endParaRPr lang="ko-KR" altLang="en-US" dirty="0"/>
+          </a:p>
+        </p:txBody>
+      </p:sp>
+      <p:sp>
+        <p:nvSpPr>
+          <p:cNvPr id="21" name="TextBox 20"/>
+          <p:cNvSpPr txBox="1"/>
+          <p:nvPr/>
+        </p:nvSpPr>
+        <p:spPr>
+          <a:xfrm>
+            <a:off x="4530252" y="4511040"/>
+            <a:ext cx="2857740" cy="1477328"/>
+          </a:xfrm>
+          <a:prstGeom prst="rect">
+            <a:avLst/>
+          </a:prstGeom>
+          <a:noFill/>
+        </p:spPr>
+        <p:txBody>
+          <a:bodyPr wrap="square" rtlCol="0">
+            <a:spAutoFit/>
+          </a:bodyPr>
+          <a:lstStyle/>
+          <a:p>
+            <a:pPr marL="285750" indent="-285750">
+              <a:buFontTx/>
+              <a:buChar char="-"/>
+            </a:pPr>
+            <a:r>
+              <a:rPr lang="ko-KR" altLang="en-US" dirty="0" smtClean="0"/>
+              <a:t>회원 가입</a:t>
+            </a:r>
+            <a:endParaRPr lang="en-US" altLang="ko-KR" dirty="0" smtClean="0"/>
+          </a:p>
+          <a:p>
+            <a:pPr marL="285750" indent="-285750">
+              <a:buFontTx/>
+              <a:buChar char="-"/>
+            </a:pPr>
+            <a:r>
+              <a:rPr lang="ko-KR" altLang="en-US" dirty="0" smtClean="0"/>
+              <a:t>로그인</a:t>
+            </a:r>
+            <a:endParaRPr lang="en-US" altLang="ko-KR" dirty="0" smtClean="0"/>
+          </a:p>
+          <a:p>
+            <a:pPr marL="285750" indent="-285750">
+              <a:buFontTx/>
+              <a:buChar char="-"/>
+            </a:pPr>
+            <a:r>
+              <a:rPr lang="ko-KR" altLang="en-US" dirty="0" smtClean="0"/>
+              <a:t>계정 설정</a:t>
+            </a:r>
+            <a:endParaRPr lang="en-US" altLang="ko-KR" dirty="0"/>
+          </a:p>
+          <a:p>
+            <a:pPr marL="285750" indent="-285750">
+              <a:buFontTx/>
+              <a:buChar char="-"/>
+            </a:pPr>
+            <a:r>
+              <a:rPr lang="en-US" altLang="ko-KR" dirty="0" smtClean="0"/>
+              <a:t>Web</a:t>
+            </a:r>
+          </a:p>
+          <a:p>
+            <a:pPr marL="285750" indent="-285750">
+              <a:buFontTx/>
+              <a:buChar char="-"/>
+            </a:pPr>
+            <a:endParaRPr lang="ko-KR" altLang="en-US" dirty="0"/>
+          </a:p>
+        </p:txBody>
+      </p:sp>
+      <p:sp>
+        <p:nvSpPr>
+          <p:cNvPr id="23" name="TextBox 22"/>
+          <p:cNvSpPr txBox="1"/>
+          <p:nvPr/>
+        </p:nvSpPr>
+        <p:spPr>
+          <a:xfrm>
+            <a:off x="8121056" y="4505603"/>
+            <a:ext cx="2857740" cy="923330"/>
+          </a:xfrm>
+          <a:prstGeom prst="rect">
+            <a:avLst/>
+          </a:prstGeom>
+          <a:noFill/>
+        </p:spPr>
+        <p:txBody>
+          <a:bodyPr wrap="square" rtlCol="0">
+            <a:spAutoFit/>
+          </a:bodyPr>
+          <a:lstStyle/>
+          <a:p>
+            <a:pPr marL="285750" indent="-285750">
+              <a:buFontTx/>
+              <a:buChar char="-"/>
+            </a:pPr>
+            <a:r>
+              <a:rPr lang="ko-KR" altLang="en-US" dirty="0" smtClean="0"/>
+              <a:t>앨범 </a:t>
+            </a:r>
+            <a:r>
+              <a:rPr lang="en-US" altLang="ko-KR" dirty="0" smtClean="0"/>
+              <a:t>/ </a:t>
+            </a:r>
+            <a:r>
+              <a:rPr lang="ko-KR" altLang="en-US" dirty="0" smtClean="0"/>
+              <a:t>사진 기능</a:t>
+            </a:r>
+            <a:endParaRPr lang="en-US" altLang="ko-KR" dirty="0" smtClean="0"/>
+          </a:p>
+          <a:p>
+            <a:pPr marL="285750" indent="-285750">
+              <a:buFontTx/>
+              <a:buChar char="-"/>
+            </a:pPr>
+            <a:r>
+              <a:rPr lang="ko-KR" altLang="en-US" dirty="0" smtClean="0"/>
+              <a:t>미션 </a:t>
+            </a:r>
+            <a:r>
+              <a:rPr lang="en-US" altLang="ko-KR" dirty="0" smtClean="0"/>
+              <a:t>/ </a:t>
+            </a:r>
+            <a:r>
+              <a:rPr lang="ko-KR" altLang="en-US" dirty="0" smtClean="0"/>
+              <a:t>퀴즈</a:t>
+            </a:r>
+            <a:endParaRPr lang="en-US" altLang="ko-KR" dirty="0" smtClean="0"/>
+          </a:p>
+          <a:p>
+            <a:pPr marL="285750" indent="-285750">
+              <a:buFontTx/>
+              <a:buChar char="-"/>
+            </a:pPr>
+            <a:r>
+              <a:rPr lang="ko-KR" altLang="en-US" dirty="0" smtClean="0"/>
+              <a:t>가족 관계 설정</a:t>
+            </a:r>
+            <a:endParaRPr lang="en-US" altLang="ko-KR" dirty="0" smtClean="0"/>
+          </a:p>
+        </p:txBody>
+      </p:sp>
+      <p:sp>
+        <p:nvSpPr>
+          <p:cNvPr id="24" name="TextBox 23"/>
+          <p:cNvSpPr txBox="1"/>
+          <p:nvPr/>
+        </p:nvSpPr>
+        <p:spPr>
+          <a:xfrm>
+            <a:off x="2079071" y="4569307"/>
+            <a:ext cx="1797094" cy="1200329"/>
+          </a:xfrm>
+          <a:prstGeom prst="rect">
+            <a:avLst/>
+          </a:prstGeom>
+          <a:noFill/>
+        </p:spPr>
+        <p:txBody>
+          <a:bodyPr wrap="square" rtlCol="0">
+            <a:spAutoFit/>
+          </a:bodyPr>
+          <a:lstStyle/>
+          <a:p>
+            <a:pPr marL="285750" indent="-285750">
+              <a:buFontTx/>
+              <a:buChar char="-"/>
+            </a:pPr>
+            <a:r>
+              <a:rPr lang="ko-KR" altLang="en-US" dirty="0" smtClean="0"/>
+              <a:t>푸시 알림</a:t>
+            </a:r>
+            <a:endParaRPr lang="en-US" altLang="ko-KR" dirty="0" smtClean="0"/>
+          </a:p>
+          <a:p>
+            <a:pPr marL="285750" indent="-285750">
+              <a:buFontTx/>
+              <a:buChar char="-"/>
+            </a:pPr>
+            <a:r>
+              <a:rPr lang="ko-KR" altLang="en-US" dirty="0" smtClean="0"/>
+              <a:t>사진 업로드</a:t>
+            </a:r>
+            <a:endParaRPr lang="en-US" altLang="ko-KR" dirty="0" smtClean="0"/>
+          </a:p>
+          <a:p>
+            <a:pPr marL="285750" indent="-285750">
+              <a:buFontTx/>
+              <a:buChar char="-"/>
+            </a:pPr>
+            <a:r>
+              <a:rPr lang="ko-KR" altLang="en-US" dirty="0" smtClean="0"/>
+              <a:t>배포</a:t>
+            </a:r>
+            <a:endParaRPr lang="en-US" altLang="ko-KR" dirty="0" smtClean="0"/>
+          </a:p>
+          <a:p>
+            <a:pPr marL="285750" indent="-285750">
+              <a:buFontTx/>
+              <a:buChar char="-"/>
+            </a:pPr>
+            <a:endParaRPr lang="en-US" altLang="ko-KR" dirty="0" smtClean="0"/>
+          </a:p>
+        </p:txBody>
+      </p:sp>
+      <p:sp>
+        <p:nvSpPr>
+          <p:cNvPr id="25" name="모서리가 둥근 직사각형 24"/>
+          <p:cNvSpPr/>
+          <p:nvPr/>
+        </p:nvSpPr>
+        <p:spPr>
+          <a:xfrm>
+            <a:off x="1799028" y="1989467"/>
+            <a:ext cx="2238891" cy="4213213"/>
+          </a:xfrm>
+          <a:prstGeom prst="roundRect">
+            <a:avLst>
+              <a:gd name="adj" fmla="val 23474"/>
+            </a:avLst>
+          </a:prstGeom>
+          <a:noFill/>
+        </p:spPr>
+        <p:style>
+          <a:lnRef idx="2">
+            <a:schemeClr val="accent1">
+              <a:shade val="50000"/>
+            </a:schemeClr>
+          </a:lnRef>
+          <a:fillRef idx="1">
+            <a:schemeClr val="accent1"/>
+          </a:fillRef>
+          <a:effectRef idx="0">
+            <a:schemeClr val="accent1"/>
+          </a:effectRef>
+          <a:fontRef idx="minor">
+            <a:schemeClr val="lt1"/>
+          </a:fontRef>
+        </p:style>
+        <p:txBody>
+          <a:bodyPr rtlCol="0" anchor="ctr"/>
+          <a:lstStyle/>
+          <a:p>
+            <a:pPr algn="ctr"/>
+            <a:endParaRPr lang="ko-KR" altLang="en-US"/>
+          </a:p>
+        </p:txBody>
+      </p:sp>
+      <p:pic>
+        <p:nvPicPr>
+          <p:cNvPr id="26" name="그림 25"/>
+          <p:cNvPicPr>
+            <a:picLocks noChangeAspect="1"/>
+          </p:cNvPicPr>
+          <p:nvPr/>
+        </p:nvPicPr>
+        <p:blipFill>
+          <a:blip r:embed="rId8">
+            <a:extLst>
+              <a:ext uri="{28A0092B-C50C-407E-A947-70E740481C1C}">
+                <a14:useLocalDpi xmlns:a14="http://schemas.microsoft.com/office/drawing/2010/main" val="0"/>
+              </a:ext>
+            </a:extLst>
+          </a:blip>
+          <a:stretch>
+            <a:fillRect/>
+          </a:stretch>
+        </p:blipFill>
+        <p:spPr>
+          <a:xfrm>
+            <a:off x="8304265" y="1749721"/>
+            <a:ext cx="908483" cy="908483"/>
+          </a:xfrm>
+          <a:prstGeom prst="rect">
+            <a:avLst/>
+          </a:prstGeom>
+        </p:spPr>
+      </p:pic>
+      <p:pic>
+        <p:nvPicPr>
+          <p:cNvPr id="29" name="그림 28"/>
+          <p:cNvPicPr>
+            <a:picLocks noChangeAspect="1"/>
+          </p:cNvPicPr>
+          <p:nvPr/>
+        </p:nvPicPr>
+        <p:blipFill>
+          <a:blip r:embed="rId9">
+            <a:extLst>
+              <a:ext uri="{28A0092B-C50C-407E-A947-70E740481C1C}">
+                <a14:useLocalDpi xmlns:a14="http://schemas.microsoft.com/office/drawing/2010/main" val="0"/>
+              </a:ext>
+            </a:extLst>
+          </a:blip>
+          <a:stretch>
+            <a:fillRect/>
+          </a:stretch>
+        </p:blipFill>
+        <p:spPr>
+          <a:xfrm>
+            <a:off x="2286939" y="2040667"/>
+            <a:ext cx="1488165" cy="1251412"/>
+          </a:xfrm>
+          <a:prstGeom prst="rect">
+            <a:avLst/>
+          </a:prstGeom>
+        </p:spPr>
+      </p:pic>
+      <p:pic>
+        <p:nvPicPr>
+          <p:cNvPr id="30" name="그림 29"/>
+          <p:cNvPicPr>
+            <a:picLocks noChangeAspect="1"/>
+          </p:cNvPicPr>
+          <p:nvPr/>
+        </p:nvPicPr>
+        <p:blipFill>
+          <a:blip r:embed="rId9">
+            <a:extLst>
+              <a:ext uri="{28A0092B-C50C-407E-A947-70E740481C1C}">
+                <a14:useLocalDpi xmlns:a14="http://schemas.microsoft.com/office/drawing/2010/main" val="0"/>
+              </a:ext>
+            </a:extLst>
+          </a:blip>
+          <a:stretch>
+            <a:fillRect/>
+          </a:stretch>
+        </p:blipFill>
+        <p:spPr>
+          <a:xfrm>
+            <a:off x="4530252" y="2024873"/>
+            <a:ext cx="1428684" cy="1201394"/>
+          </a:xfrm>
+          <a:prstGeom prst="rect">
+            <a:avLst/>
+          </a:prstGeom>
+        </p:spPr>
+      </p:pic>
+      <p:pic>
+        <p:nvPicPr>
+          <p:cNvPr id="31" name="그림 30"/>
+          <p:cNvPicPr>
+            <a:picLocks noChangeAspect="1"/>
+          </p:cNvPicPr>
+          <p:nvPr/>
+        </p:nvPicPr>
+        <p:blipFill>
+          <a:blip r:embed="rId9">
+            <a:extLst>
+              <a:ext uri="{28A0092B-C50C-407E-A947-70E740481C1C}">
+                <a14:useLocalDpi xmlns:a14="http://schemas.microsoft.com/office/drawing/2010/main" val="0"/>
+              </a:ext>
+            </a:extLst>
+          </a:blip>
+          <a:stretch>
+            <a:fillRect/>
+          </a:stretch>
+        </p:blipFill>
+        <p:spPr>
+          <a:xfrm>
+            <a:off x="6128468" y="2151931"/>
+            <a:ext cx="1175544" cy="988526"/>
+          </a:xfrm>
+          <a:prstGeom prst="rect">
+            <a:avLst/>
+          </a:prstGeom>
+        </p:spPr>
+      </p:pic>
+      <p:pic>
+        <p:nvPicPr>
+          <p:cNvPr id="32" name="그림 31"/>
+          <p:cNvPicPr>
+            <a:picLocks noChangeAspect="1"/>
+          </p:cNvPicPr>
+          <p:nvPr/>
+        </p:nvPicPr>
+        <p:blipFill>
+          <a:blip r:embed="rId9">
+            <a:extLst>
+              <a:ext uri="{28A0092B-C50C-407E-A947-70E740481C1C}">
+                <a14:useLocalDpi xmlns:a14="http://schemas.microsoft.com/office/drawing/2010/main" val="0"/>
+              </a:ext>
+            </a:extLst>
+          </a:blip>
+          <a:stretch>
+            <a:fillRect/>
+          </a:stretch>
+        </p:blipFill>
+        <p:spPr>
+          <a:xfrm>
+            <a:off x="9782299" y="2127846"/>
+            <a:ext cx="1145033" cy="962869"/>
+          </a:xfrm>
+          <a:prstGeom prst="rect">
+            <a:avLst/>
+          </a:prstGeom>
+        </p:spPr>
+      </p:pic>
+      <p:pic>
+        <p:nvPicPr>
+          <p:cNvPr id="33" name="그림 32"/>
+          <p:cNvPicPr>
+            <a:picLocks noChangeAspect="1"/>
+          </p:cNvPicPr>
+          <p:nvPr/>
+        </p:nvPicPr>
+        <p:blipFill>
+          <a:blip r:embed="rId10">
+            <a:extLst>
+              <a:ext uri="{28A0092B-C50C-407E-A947-70E740481C1C}">
+                <a14:useLocalDpi xmlns:a14="http://schemas.microsoft.com/office/drawing/2010/main" val="0"/>
+              </a:ext>
+            </a:extLst>
+          </a:blip>
+          <a:stretch>
+            <a:fillRect/>
+          </a:stretch>
+        </p:blipFill>
+        <p:spPr>
+          <a:xfrm flipH="1">
+            <a:off x="7817285" y="3106377"/>
+            <a:ext cx="859155" cy="859155"/>
+          </a:xfrm>
+          <a:prstGeom prst="rect">
+            <a:avLst/>
+          </a:prstGeom>
+        </p:spPr>
+      </p:pic>
     </p:spTree>
     <p:extLst>
       <p:ext uri="{BB962C8B-B14F-4D97-AF65-F5344CB8AC3E}">

</xml_diff>